<commit_message>
Updated presentation with demo
</commit_message>
<xml_diff>
--- a/Python for Data Analysis/Final-Project/Presentation.pptx
+++ b/Python for Data Analysis/Final-Project/Presentation.pptx
@@ -5,7 +5,7 @@
     <p:sldMasterId id="2147483699" r:id="rId1"/>
   </p:sldMasterIdLst>
   <p:notesMasterIdLst>
-    <p:notesMasterId r:id="rId7"/>
+    <p:notesMasterId r:id="rId8"/>
   </p:notesMasterIdLst>
   <p:sldIdLst>
     <p:sldId id="256" r:id="rId2"/>
@@ -13,6 +13,7 @@
     <p:sldId id="258" r:id="rId4"/>
     <p:sldId id="259" r:id="rId5"/>
     <p:sldId id="260" r:id="rId6"/>
+    <p:sldId id="261" r:id="rId7"/>
   </p:sldIdLst>
   <p:sldSz cx="9144000" cy="5143500" type="screen16x9"/>
   <p:notesSz cx="6858000" cy="9144000"/>
@@ -111,6 +112,11 @@
       </a:defRPr>
     </a:lvl9pPr>
   </p:defaultTextStyle>
+  <p:extLst>
+    <p:ext uri="{EFAFB233-063F-42B5-8137-9DF3F51BA10A}">
+      <p15:sldGuideLst xmlns:p15="http://schemas.microsoft.com/office/powerpoint/2012/main"/>
+    </p:ext>
+  </p:extLst>
 </p:presentation>
 </file>
 
@@ -1106,7 +1112,7 @@
           <a:p>
             <a:fld id="{BAF2FCBC-F2F4-4468-9634-A7882408459A}" type="datetimeFigureOut">
               <a:rPr lang="en-US" smtClean="0"/>
-              <a:t>10/29/2017</a:t>
+              <a:t>10/30/2017</a:t>
             </a:fld>
             <a:endParaRPr lang="en-US"/>
           </a:p>
@@ -1329,7 +1335,7 @@
           <a:p>
             <a:fld id="{BAF2FCBC-F2F4-4468-9634-A7882408459A}" type="datetimeFigureOut">
               <a:rPr lang="en-US" smtClean="0"/>
-              <a:t>10/29/2017</a:t>
+              <a:t>10/30/2017</a:t>
             </a:fld>
             <a:endParaRPr lang="en-US"/>
           </a:p>
@@ -1600,7 +1606,7 @@
           <a:p>
             <a:fld id="{BAF2FCBC-F2F4-4468-9634-A7882408459A}" type="datetimeFigureOut">
               <a:rPr lang="en-US" smtClean="0"/>
-              <a:t>10/29/2017</a:t>
+              <a:t>10/30/2017</a:t>
             </a:fld>
             <a:endParaRPr lang="en-US"/>
           </a:p>
@@ -2022,7 +2028,7 @@
           <a:p>
             <a:fld id="{BAF2FCBC-F2F4-4468-9634-A7882408459A}" type="datetimeFigureOut">
               <a:rPr lang="en-US" smtClean="0"/>
-              <a:t>10/29/2017</a:t>
+              <a:t>10/30/2017</a:t>
             </a:fld>
             <a:endParaRPr lang="en-US"/>
           </a:p>
@@ -2380,7 +2386,7 @@
           <a:p>
             <a:fld id="{BAF2FCBC-F2F4-4468-9634-A7882408459A}" type="datetimeFigureOut">
               <a:rPr lang="en-US" smtClean="0"/>
-              <a:t>10/29/2017</a:t>
+              <a:t>10/30/2017</a:t>
             </a:fld>
             <a:endParaRPr lang="en-US"/>
           </a:p>
@@ -2670,7 +2676,7 @@
           <a:p>
             <a:fld id="{BAF2FCBC-F2F4-4468-9634-A7882408459A}" type="datetimeFigureOut">
               <a:rPr lang="en-US" smtClean="0"/>
-              <a:t>10/29/2017</a:t>
+              <a:t>10/30/2017</a:t>
             </a:fld>
             <a:endParaRPr lang="en-US"/>
           </a:p>
@@ -3064,7 +3070,7 @@
           <a:p>
             <a:fld id="{BAF2FCBC-F2F4-4468-9634-A7882408459A}" type="datetimeFigureOut">
               <a:rPr lang="en-US" smtClean="0"/>
-              <a:t>10/29/2017</a:t>
+              <a:t>10/30/2017</a:t>
             </a:fld>
             <a:endParaRPr lang="en-US"/>
           </a:p>
@@ -3197,7 +3203,7 @@
           <a:p>
             <a:fld id="{BAF2FCBC-F2F4-4468-9634-A7882408459A}" type="datetimeFigureOut">
               <a:rPr lang="en-US" smtClean="0"/>
-              <a:t>10/29/2017</a:t>
+              <a:t>10/30/2017</a:t>
             </a:fld>
             <a:endParaRPr lang="en-US"/>
           </a:p>
@@ -3383,7 +3389,7 @@
           <a:p>
             <a:fld id="{BAF2FCBC-F2F4-4468-9634-A7882408459A}" type="datetimeFigureOut">
               <a:rPr lang="en-US" smtClean="0"/>
-              <a:t>10/29/2017</a:t>
+              <a:t>10/30/2017</a:t>
             </a:fld>
             <a:endParaRPr lang="en-US"/>
           </a:p>
@@ -3743,7 +3749,7 @@
           <a:p>
             <a:fld id="{BAF2FCBC-F2F4-4468-9634-A7882408459A}" type="datetimeFigureOut">
               <a:rPr lang="en-US" smtClean="0"/>
-              <a:t>10/29/2017</a:t>
+              <a:t>10/30/2017</a:t>
             </a:fld>
             <a:endParaRPr lang="en-US"/>
           </a:p>
@@ -4140,7 +4146,7 @@
           <a:p>
             <a:fld id="{BAF2FCBC-F2F4-4468-9634-A7882408459A}" type="datetimeFigureOut">
               <a:rPr lang="en-US" smtClean="0"/>
-              <a:t>10/29/2017</a:t>
+              <a:t>10/30/2017</a:t>
             </a:fld>
             <a:endParaRPr lang="en-US"/>
           </a:p>
@@ -4442,7 +4448,7 @@
           <a:p>
             <a:fld id="{BAF2FCBC-F2F4-4468-9634-A7882408459A}" type="datetimeFigureOut">
               <a:rPr lang="en-US" smtClean="0"/>
-              <a:t>10/29/2017</a:t>
+              <a:t>10/30/2017</a:t>
             </a:fld>
             <a:endParaRPr lang="en-US"/>
           </a:p>
@@ -6022,6 +6028,94 @@
         </p:spPr>
       </p:cxnSp>
     </p:spTree>
+  </p:cSld>
+  <p:clrMapOvr>
+    <a:masterClrMapping/>
+  </p:clrMapOvr>
+</p:sld>
+</file>
+
+<file path=ppt/slides/slide6.xml><?xml version="1.0" encoding="utf-8"?>
+<p:sld xmlns:a="http://schemas.openxmlformats.org/drawingml/2006/main" xmlns:r="http://schemas.openxmlformats.org/officeDocument/2006/relationships" xmlns:p="http://schemas.openxmlformats.org/presentationml/2006/main">
+  <p:cSld>
+    <p:spTree>
+      <p:nvGrpSpPr>
+        <p:cNvPr id="1" name=""/>
+        <p:cNvGrpSpPr/>
+        <p:nvPr/>
+      </p:nvGrpSpPr>
+      <p:grpSpPr>
+        <a:xfrm>
+          <a:off x="0" y="0"/>
+          <a:ext cx="0" cy="0"/>
+          <a:chOff x="0" y="0"/>
+          <a:chExt cx="0" cy="0"/>
+        </a:xfrm>
+      </p:grpSpPr>
+      <p:sp>
+        <p:nvSpPr>
+          <p:cNvPr id="2" name="Title 1">
+            <a:extLst>
+              <a:ext uri="{FF2B5EF4-FFF2-40B4-BE49-F238E27FC236}">
+                <a16:creationId xmlns:a16="http://schemas.microsoft.com/office/drawing/2014/main" id="{10B4E2F8-7D28-41EC-AAC6-B967800D8AFF}"/>
+              </a:ext>
+            </a:extLst>
+          </p:cNvPr>
+          <p:cNvSpPr>
+            <a:spLocks noGrp="1"/>
+          </p:cNvSpPr>
+          <p:nvPr>
+            <p:ph type="title"/>
+          </p:nvPr>
+        </p:nvSpPr>
+        <p:spPr/>
+        <p:txBody>
+          <a:bodyPr>
+            <a:normAutofit/>
+          </a:bodyPr>
+          <a:lstStyle/>
+          <a:p>
+            <a:r>
+              <a:rPr lang="en-US" dirty="0">
+                <a:hlinkClick r:id="rId2"/>
+              </a:rPr>
+              <a:t>Demo</a:t>
+            </a:r>
+            <a:endParaRPr lang="en-US" dirty="0"/>
+          </a:p>
+        </p:txBody>
+      </p:sp>
+      <p:sp>
+        <p:nvSpPr>
+          <p:cNvPr id="4" name="Text Placeholder 3">
+            <a:extLst>
+              <a:ext uri="{FF2B5EF4-FFF2-40B4-BE49-F238E27FC236}">
+                <a16:creationId xmlns:a16="http://schemas.microsoft.com/office/drawing/2014/main" id="{318B560D-D64B-4E9E-9BAA-31817C061EA4}"/>
+              </a:ext>
+            </a:extLst>
+          </p:cNvPr>
+          <p:cNvSpPr>
+            <a:spLocks noGrp="1"/>
+          </p:cNvSpPr>
+          <p:nvPr>
+            <p:ph type="body" idx="1"/>
+          </p:nvPr>
+        </p:nvSpPr>
+        <p:spPr/>
+        <p:txBody>
+          <a:bodyPr/>
+          <a:lstStyle/>
+          <a:p>
+            <a:endParaRPr lang="en-US" dirty="0"/>
+          </a:p>
+        </p:txBody>
+      </p:sp>
+    </p:spTree>
+    <p:extLst>
+      <p:ext uri="{BB962C8B-B14F-4D97-AF65-F5344CB8AC3E}">
+        <p14:creationId xmlns:p14="http://schemas.microsoft.com/office/powerpoint/2010/main" val="2715690745"/>
+      </p:ext>
+    </p:extLst>
   </p:cSld>
   <p:clrMapOvr>
     <a:masterClrMapping/>

</xml_diff>